<commit_message>
[DEV MOEL]: model_tuning.py addition of fitting graph, soutenance.pptx finalization of slides
</commit_message>
<xml_diff>
--- a/Soutenance.pptx
+++ b/Soutenance.pptx
@@ -12,10 +12,10 @@
     <p:sldId id="258" r:id="rId3"/>
     <p:sldId id="259" r:id="rId4"/>
     <p:sldId id="262" r:id="rId5"/>
-    <p:sldId id="263" r:id="rId6"/>
-    <p:sldId id="266" r:id="rId7"/>
-    <p:sldId id="265" r:id="rId8"/>
-    <p:sldId id="264" r:id="rId9"/>
+    <p:sldId id="270" r:id="rId6"/>
+    <p:sldId id="272" r:id="rId7"/>
+    <p:sldId id="271" r:id="rId8"/>
+    <p:sldId id="266" r:id="rId9"/>
   </p:sldIdLst>
   <p:sldSz cx="12192000" cy="6858000"/>
   <p:notesSz cx="6858000" cy="9144000"/>
@@ -204,7 +204,7 @@
           <a:p>
             <a:fld id="{87F6452A-2A59-B34F-A75F-9F5D561EF825}" type="datetimeFigureOut">
               <a:rPr lang="fr-FR" smtClean="0"/>
-              <a:t>16/12/2023</a:t>
+              <a:t>17/12/2023</a:t>
             </a:fld>
             <a:endParaRPr lang="fr-FR"/>
           </a:p>
@@ -471,90 +471,6 @@
 </p:notesMaster>
 </file>
 
-<file path=ppt/notesSlides/notesSlide1.xml><?xml version="1.0" encoding="utf-8"?>
-<p:notes xmlns:a="http://schemas.openxmlformats.org/drawingml/2006/main" xmlns:r="http://schemas.openxmlformats.org/officeDocument/2006/relationships" xmlns:p="http://schemas.openxmlformats.org/presentationml/2006/main">
-  <p:cSld>
-    <p:spTree>
-      <p:nvGrpSpPr>
-        <p:cNvPr id="1" name=""/>
-        <p:cNvGrpSpPr/>
-        <p:nvPr/>
-      </p:nvGrpSpPr>
-      <p:grpSpPr>
-        <a:xfrm>
-          <a:off x="0" y="0"/>
-          <a:ext cx="0" cy="0"/>
-          <a:chOff x="0" y="0"/>
-          <a:chExt cx="0" cy="0"/>
-        </a:xfrm>
-      </p:grpSpPr>
-      <p:sp>
-        <p:nvSpPr>
-          <p:cNvPr id="2" name="Espace réservé de l'image des diapositives 1"/>
-          <p:cNvSpPr>
-            <a:spLocks noGrp="1" noRot="1" noChangeAspect="1"/>
-          </p:cNvSpPr>
-          <p:nvPr>
-            <p:ph type="sldImg"/>
-          </p:nvPr>
-        </p:nvSpPr>
-        <p:spPr/>
-      </p:sp>
-      <p:sp>
-        <p:nvSpPr>
-          <p:cNvPr id="3" name="Espace réservé des notes 2"/>
-          <p:cNvSpPr>
-            <a:spLocks noGrp="1"/>
-          </p:cNvSpPr>
-          <p:nvPr>
-            <p:ph type="body" idx="1"/>
-          </p:nvPr>
-        </p:nvSpPr>
-        <p:spPr/>
-        <p:txBody>
-          <a:bodyPr/>
-          <a:lstStyle/>
-          <a:p>
-            <a:endParaRPr lang="fr-FR" dirty="0"/>
-          </a:p>
-        </p:txBody>
-      </p:sp>
-      <p:sp>
-        <p:nvSpPr>
-          <p:cNvPr id="4" name="Espace réservé du numéro de diapositive 3"/>
-          <p:cNvSpPr>
-            <a:spLocks noGrp="1"/>
-          </p:cNvSpPr>
-          <p:nvPr>
-            <p:ph type="sldNum" sz="quarter" idx="5"/>
-          </p:nvPr>
-        </p:nvSpPr>
-        <p:spPr/>
-        <p:txBody>
-          <a:bodyPr/>
-          <a:lstStyle/>
-          <a:p>
-            <a:fld id="{4C3CD4DF-17BA-F249-8E38-ACE2301D34B6}" type="slidenum">
-              <a:rPr lang="fr-FR" smtClean="0"/>
-              <a:t>8</a:t>
-            </a:fld>
-            <a:endParaRPr lang="fr-FR"/>
-          </a:p>
-        </p:txBody>
-      </p:sp>
-    </p:spTree>
-    <p:extLst>
-      <p:ext uri="{BB962C8B-B14F-4D97-AF65-F5344CB8AC3E}">
-        <p14:creationId xmlns:p14="http://schemas.microsoft.com/office/powerpoint/2010/main" val="710372014"/>
-      </p:ext>
-    </p:extLst>
-  </p:cSld>
-  <p:clrMapOvr>
-    <a:masterClrMapping/>
-  </p:clrMapOvr>
-</p:notes>
-</file>
-
 <file path=ppt/slideLayouts/slideLayout1.xml><?xml version="1.0" encoding="utf-8"?>
 <p:sldLayout xmlns:a="http://schemas.openxmlformats.org/drawingml/2006/main" xmlns:r="http://schemas.openxmlformats.org/officeDocument/2006/relationships" xmlns:p="http://schemas.openxmlformats.org/presentationml/2006/main" showMasterSp="0" type="title" preserve="1">
   <p:cSld name="Title Slide">
@@ -711,7 +627,7 @@
           <a:p>
             <a:fld id="{1C8322F6-1C60-46CF-968C-BC20E470F443}" type="datetimeFigureOut">
               <a:rPr lang="en-US" smtClean="0"/>
-              <a:t>12/16/23</a:t>
+              <a:t>12/17/23</a:t>
             </a:fld>
             <a:endParaRPr lang="en-US"/>
           </a:p>
@@ -1132,7 +1048,7 @@
           <a:p>
             <a:fld id="{1C8322F6-1C60-46CF-968C-BC20E470F443}" type="datetimeFigureOut">
               <a:rPr lang="en-US" smtClean="0"/>
-              <a:t>12/16/23</a:t>
+              <a:t>12/17/23</a:t>
             </a:fld>
             <a:endParaRPr lang="en-US"/>
           </a:p>
@@ -1509,7 +1425,7 @@
           <a:p>
             <a:fld id="{1C8322F6-1C60-46CF-968C-BC20E470F443}" type="datetimeFigureOut">
               <a:rPr lang="en-US" smtClean="0"/>
-              <a:t>12/16/23</a:t>
+              <a:t>12/17/23</a:t>
             </a:fld>
             <a:endParaRPr lang="en-US"/>
           </a:p>
@@ -1762,7 +1678,7 @@
           <a:p>
             <a:fld id="{1C8322F6-1C60-46CF-968C-BC20E470F443}" type="datetimeFigureOut">
               <a:rPr lang="en-US" smtClean="0"/>
-              <a:t>12/16/23</a:t>
+              <a:t>12/17/23</a:t>
             </a:fld>
             <a:endParaRPr lang="en-US"/>
           </a:p>
@@ -2096,7 +2012,7 @@
           <a:p>
             <a:fld id="{1C8322F6-1C60-46CF-968C-BC20E470F443}" type="datetimeFigureOut">
               <a:rPr lang="en-US" smtClean="0"/>
-              <a:t>12/16/23</a:t>
+              <a:t>12/17/23</a:t>
             </a:fld>
             <a:endParaRPr lang="en-US"/>
           </a:p>
@@ -2377,7 +2293,7 @@
           <a:p>
             <a:fld id="{1C8322F6-1C60-46CF-968C-BC20E470F443}" type="datetimeFigureOut">
               <a:rPr lang="en-US" smtClean="0"/>
-              <a:t>12/16/23</a:t>
+              <a:t>12/17/23</a:t>
             </a:fld>
             <a:endParaRPr lang="en-US"/>
           </a:p>
@@ -2779,7 +2695,7 @@
           <a:p>
             <a:fld id="{1C8322F6-1C60-46CF-968C-BC20E470F443}" type="datetimeFigureOut">
               <a:rPr lang="en-US" smtClean="0"/>
-              <a:t>12/16/23</a:t>
+              <a:t>12/17/23</a:t>
             </a:fld>
             <a:endParaRPr lang="en-US"/>
           </a:p>
@@ -3240,7 +3156,7 @@
           <a:p>
             <a:fld id="{1C8322F6-1C60-46CF-968C-BC20E470F443}" type="datetimeFigureOut">
               <a:rPr lang="en-US" smtClean="0"/>
-              <a:t>12/16/23</a:t>
+              <a:t>12/17/23</a:t>
             </a:fld>
             <a:endParaRPr lang="en-US"/>
           </a:p>
@@ -3473,7 +3389,7 @@
           <a:p>
             <a:fld id="{1C8322F6-1C60-46CF-968C-BC20E470F443}" type="datetimeFigureOut">
               <a:rPr lang="en-US" smtClean="0"/>
-              <a:t>12/16/23</a:t>
+              <a:t>12/17/23</a:t>
             </a:fld>
             <a:endParaRPr lang="en-US"/>
           </a:p>
@@ -3895,7 +3811,7 @@
           <a:p>
             <a:fld id="{1C8322F6-1C60-46CF-968C-BC20E470F443}" type="datetimeFigureOut">
               <a:rPr lang="en-US" smtClean="0"/>
-              <a:t>12/16/23</a:t>
+              <a:t>12/17/23</a:t>
             </a:fld>
             <a:endParaRPr lang="en-US"/>
           </a:p>
@@ -4094,7 +4010,7 @@
           <a:p>
             <a:fld id="{1C8322F6-1C60-46CF-968C-BC20E470F443}" type="datetimeFigureOut">
               <a:rPr lang="en-US" smtClean="0"/>
-              <a:t>12/16/23</a:t>
+              <a:t>12/17/23</a:t>
             </a:fld>
             <a:endParaRPr lang="en-US"/>
           </a:p>
@@ -4407,7 +4323,7 @@
           <a:p>
             <a:fld id="{1C8322F6-1C60-46CF-968C-BC20E470F443}" type="datetimeFigureOut">
               <a:rPr lang="en-US" smtClean="0"/>
-              <a:t>12/16/23</a:t>
+              <a:t>12/17/23</a:t>
             </a:fld>
             <a:endParaRPr lang="en-US"/>
           </a:p>
@@ -4820,7 +4736,7 @@
           <a:p>
             <a:fld id="{1C8322F6-1C60-46CF-968C-BC20E470F443}" type="datetimeFigureOut">
               <a:rPr lang="en-US" smtClean="0"/>
-              <a:t>12/16/23</a:t>
+              <a:t>12/17/23</a:t>
             </a:fld>
             <a:endParaRPr lang="en-US"/>
           </a:p>
@@ -6493,7 +6409,7 @@
           <a:p>
             <a:r>
               <a:rPr lang="fr-FR" dirty="0"/>
-              <a:t>Le set de données choisi</a:t>
+              <a:t>Le set de données</a:t>
             </a:r>
           </a:p>
         </p:txBody>
@@ -6512,8 +6428,8 @@
         </p:nvSpPr>
         <p:spPr>
           <a:xfrm>
-            <a:off x="7815263" y="1944468"/>
-            <a:ext cx="3805237" cy="1477328"/>
+            <a:off x="7708900" y="1944468"/>
+            <a:ext cx="3940175" cy="3139321"/>
           </a:xfrm>
           <a:prstGeom prst="rect">
             <a:avLst/>
@@ -6527,64 +6443,76 @@
           <a:lstStyle/>
           <a:p>
             <a:r>
-              <a:rPr lang="fr-FR" dirty="0">
-                <a:solidFill>
-                  <a:srgbClr val="FF0000"/>
-                </a:solidFill>
-              </a:rPr>
-              <a:t>PAUL ARISITDOU :</a:t>
-            </a:r>
-          </a:p>
-          <a:p>
-            <a:r>
-              <a:rPr lang="fr-FR" dirty="0">
-                <a:solidFill>
-                  <a:srgbClr val="FF0000"/>
-                </a:solidFill>
-              </a:rPr>
-              <a:t>Décrire les données</a:t>
-            </a:r>
-          </a:p>
-          <a:p>
-            <a:pPr marL="285750" indent="-285750">
-              <a:buFont typeface="Arial" panose="020B0604020202020204" pitchFamily="34" charset="0"/>
-              <a:buChar char="•"/>
-            </a:pPr>
-            <a:r>
-              <a:rPr lang="fr-FR" dirty="0">
-                <a:solidFill>
-                  <a:srgbClr val="FF0000"/>
-                </a:solidFill>
-              </a:rPr>
-              <a:t>XXX</a:t>
-            </a:r>
-          </a:p>
-          <a:p>
-            <a:pPr marL="285750" indent="-285750">
-              <a:buFont typeface="Arial" panose="020B0604020202020204" pitchFamily="34" charset="0"/>
-              <a:buChar char="•"/>
-            </a:pPr>
-            <a:r>
-              <a:rPr lang="fr-FR" b="1" dirty="0">
-                <a:solidFill>
-                  <a:srgbClr val="FF0000"/>
-                </a:solidFill>
-              </a:rPr>
-              <a:t>XXX</a:t>
-            </a:r>
-          </a:p>
-          <a:p>
-            <a:pPr marL="285750" indent="-285750">
-              <a:buFont typeface="Arial" panose="020B0604020202020204" pitchFamily="34" charset="0"/>
-              <a:buChar char="•"/>
-            </a:pPr>
-            <a:r>
-              <a:rPr lang="fr-FR" b="1" dirty="0">
-                <a:solidFill>
-                  <a:srgbClr val="FF0000"/>
-                </a:solidFill>
-              </a:rPr>
-              <a:t>XXX</a:t>
+              <a:rPr lang="fr-FR" dirty="0"/>
+              <a:t>Nous avons créé artificiellement un </a:t>
+            </a:r>
+            <a:r>
+              <a:rPr lang="fr-FR" b="1" dirty="0"/>
+              <a:t>set de données </a:t>
+            </a:r>
+            <a:r>
+              <a:rPr lang="fr-FR" dirty="0"/>
+              <a:t>suivant une loi :</a:t>
+            </a:r>
+          </a:p>
+          <a:p>
+            <a:endParaRPr lang="fr-FR" dirty="0"/>
+          </a:p>
+          <a:p>
+            <a:pPr algn="ctr"/>
+            <a:r>
+              <a:rPr lang="fr-FR" b="1" dirty="0"/>
+              <a:t>y = 1 + 2x + 3x</a:t>
+            </a:r>
+            <a:r>
+              <a:rPr lang="fr-FR" b="1" baseline="30000" dirty="0"/>
+              <a:t>2</a:t>
+            </a:r>
+            <a:r>
+              <a:rPr lang="fr-FR" b="1" dirty="0"/>
+              <a:t> - 4x</a:t>
+            </a:r>
+            <a:r>
+              <a:rPr lang="fr-FR" b="1" baseline="30000" dirty="0"/>
+              <a:t>3</a:t>
+            </a:r>
+            <a:r>
+              <a:rPr lang="fr-FR" b="1" dirty="0"/>
+              <a:t> + bruit</a:t>
+            </a:r>
+          </a:p>
+          <a:p>
+            <a:endParaRPr lang="fr-FR" dirty="0"/>
+          </a:p>
+          <a:p>
+            <a:r>
+              <a:rPr lang="fr-FR" dirty="0"/>
+              <a:t>avec un </a:t>
+            </a:r>
+            <a:r>
+              <a:rPr lang="fr-FR" b="1" dirty="0"/>
+              <a:t>bruit gaussien centré </a:t>
+            </a:r>
+            <a:r>
+              <a:rPr lang="fr-FR" dirty="0"/>
+              <a:t>de variance 10.</a:t>
+            </a:r>
+          </a:p>
+          <a:p>
+            <a:endParaRPr lang="fr-FR" dirty="0"/>
+          </a:p>
+          <a:p>
+            <a:r>
+              <a:rPr lang="fr-FR" dirty="0"/>
+              <a:t>Vue la forme du set de données, nous testerons des </a:t>
+            </a:r>
+            <a:r>
+              <a:rPr lang="fr-FR" b="1" dirty="0"/>
+              <a:t>modèles polynomiaux et exponentiels</a:t>
+            </a:r>
+            <a:r>
+              <a:rPr lang="fr-FR" dirty="0"/>
+              <a:t>.</a:t>
             </a:r>
           </a:p>
         </p:txBody>
@@ -6621,10 +6549,10 @@
       </p:grpSpPr>
       <p:sp>
         <p:nvSpPr>
-          <p:cNvPr id="2" name="Titre 1">
-            <a:extLst>
-              <a:ext uri="{FF2B5EF4-FFF2-40B4-BE49-F238E27FC236}">
-                <a16:creationId xmlns:a16="http://schemas.microsoft.com/office/drawing/2014/main" id="{281F205B-B825-3C31-A65C-D68EC1D7FA40}"/>
+          <p:cNvPr id="12" name="Titre 11">
+            <a:extLst>
+              <a:ext uri="{FF2B5EF4-FFF2-40B4-BE49-F238E27FC236}">
+                <a16:creationId xmlns:a16="http://schemas.microsoft.com/office/drawing/2014/main" id="{99C2A587-3A80-F48F-81A6-5887DC116F4C}"/>
               </a:ext>
             </a:extLst>
           </p:cNvPr>
@@ -6642,92 +6570,17 @@
           <a:p>
             <a:r>
               <a:rPr lang="fr-FR" dirty="0"/>
-              <a:t>Les résultats (1/3) : Régression polynomiale</a:t>
-            </a:r>
-          </a:p>
-        </p:txBody>
-      </p:sp>
-      <p:sp>
-        <p:nvSpPr>
-          <p:cNvPr id="8" name="Espace réservé du texte 7">
-            <a:extLst>
-              <a:ext uri="{FF2B5EF4-FFF2-40B4-BE49-F238E27FC236}">
-                <a16:creationId xmlns:a16="http://schemas.microsoft.com/office/drawing/2014/main" id="{95DE7657-08F7-35EB-1497-E6CC7C215E45}"/>
-              </a:ext>
-            </a:extLst>
-          </p:cNvPr>
-          <p:cNvSpPr>
-            <a:spLocks noGrp="1"/>
-          </p:cNvSpPr>
-          <p:nvPr>
-            <p:ph type="body" idx="1"/>
-          </p:nvPr>
-        </p:nvSpPr>
-        <p:spPr>
-          <a:xfrm>
-            <a:off x="583468" y="2022884"/>
-            <a:ext cx="1972859" cy="1668246"/>
-          </a:xfrm>
-        </p:spPr>
-        <p:txBody>
-          <a:bodyPr/>
-          <a:lstStyle/>
-          <a:p>
-            <a:r>
-              <a:rPr lang="fr-FR" dirty="0"/>
-              <a:t>Complexité</a:t>
-            </a:r>
-          </a:p>
-        </p:txBody>
-      </p:sp>
-      <p:sp>
-        <p:nvSpPr>
-          <p:cNvPr id="10" name="Espace réservé du texte 9">
-            <a:extLst>
-              <a:ext uri="{FF2B5EF4-FFF2-40B4-BE49-F238E27FC236}">
-                <a16:creationId xmlns:a16="http://schemas.microsoft.com/office/drawing/2014/main" id="{CFDFD04A-05BB-4E9D-C53A-2CCBC3B6A70C}"/>
-              </a:ext>
-            </a:extLst>
-          </p:cNvPr>
-          <p:cNvSpPr>
-            <a:spLocks noGrp="1"/>
-          </p:cNvSpPr>
-          <p:nvPr>
-            <p:ph type="body" idx="13"/>
-          </p:nvPr>
-        </p:nvSpPr>
-        <p:spPr>
-          <a:xfrm>
-            <a:off x="583468" y="3944273"/>
-            <a:ext cx="1789617" cy="1668246"/>
-          </a:xfrm>
-        </p:spPr>
-        <p:txBody>
-          <a:bodyPr/>
-          <a:lstStyle/>
-          <a:p>
-            <a:r>
-              <a:rPr lang="fr-FR" dirty="0" err="1"/>
-              <a:t>ErrEUr</a:t>
-            </a:r>
-            <a:r>
-              <a:rPr lang="fr-FR" dirty="0"/>
-              <a:t> MOYENNE AU </a:t>
-            </a:r>
-            <a:r>
-              <a:rPr lang="fr-FR" dirty="0" err="1"/>
-              <a:t>CARRé</a:t>
-            </a:r>
-            <a:endParaRPr lang="fr-FR" dirty="0"/>
+              <a:t>Les résultats : Régression polynomiale</a:t>
+            </a:r>
           </a:p>
         </p:txBody>
       </p:sp>
       <p:pic>
         <p:nvPicPr>
-          <p:cNvPr id="12" name="Image 11">
-            <a:extLst>
-              <a:ext uri="{FF2B5EF4-FFF2-40B4-BE49-F238E27FC236}">
-                <a16:creationId xmlns:a16="http://schemas.microsoft.com/office/drawing/2014/main" id="{AC3E7237-49B4-1DC7-7FB1-52345550B55A}"/>
+          <p:cNvPr id="10" name="Image 9">
+            <a:extLst>
+              <a:ext uri="{FF2B5EF4-FFF2-40B4-BE49-F238E27FC236}">
+                <a16:creationId xmlns:a16="http://schemas.microsoft.com/office/drawing/2014/main" id="{6FAD528B-D648-5B43-D986-A71C4A44BF39}"/>
               </a:ext>
             </a:extLst>
           </p:cNvPr>
@@ -6744,40 +6597,73 @@
         </p:blipFill>
         <p:spPr>
           <a:xfrm>
-            <a:off x="2556327" y="1937657"/>
-            <a:ext cx="9052203" cy="1839686"/>
+            <a:off x="583468" y="1964811"/>
+            <a:ext cx="5230469" cy="3383227"/>
           </a:xfrm>
           <a:prstGeom prst="rect">
             <a:avLst/>
           </a:prstGeom>
         </p:spPr>
       </p:pic>
-      <p:sp>
-        <p:nvSpPr>
-          <p:cNvPr id="14" name="Espace réservé du texte 9">
-            <a:extLst>
-              <a:ext uri="{FF2B5EF4-FFF2-40B4-BE49-F238E27FC236}">
-                <a16:creationId xmlns:a16="http://schemas.microsoft.com/office/drawing/2014/main" id="{03599276-2326-E315-6525-E38CF16C3850}"/>
-              </a:ext>
-            </a:extLst>
-          </p:cNvPr>
-          <p:cNvSpPr txBox="1">
-            <a:spLocks/>
-          </p:cNvSpPr>
+      <p:pic>
+        <p:nvPicPr>
+          <p:cNvPr id="11" name="Image 10">
+            <a:extLst>
+              <a:ext uri="{FF2B5EF4-FFF2-40B4-BE49-F238E27FC236}">
+                <a16:creationId xmlns:a16="http://schemas.microsoft.com/office/drawing/2014/main" id="{03B11759-E285-C8A5-CED7-7DF44D9D1400}"/>
+              </a:ext>
+            </a:extLst>
+          </p:cNvPr>
+          <p:cNvPicPr>
+            <a:picLocks noChangeAspect="1"/>
+          </p:cNvPicPr>
           <p:nvPr/>
-        </p:nvSpPr>
+        </p:nvPicPr>
+        <p:blipFill>
+          <a:blip r:embed="rId3"/>
+          <a:stretch>
+            <a:fillRect/>
+          </a:stretch>
+        </p:blipFill>
         <p:spPr>
           <a:xfrm>
-            <a:off x="675088" y="5833004"/>
-            <a:ext cx="10933441" cy="426282"/>
+            <a:off x="6252410" y="1964811"/>
+            <a:ext cx="5372248" cy="3413687"/>
           </a:xfrm>
           <a:prstGeom prst="rect">
             <a:avLst/>
           </a:prstGeom>
         </p:spPr>
+      </p:pic>
+      <p:sp>
+        <p:nvSpPr>
+          <p:cNvPr id="17" name="Espace réservé du texte 9">
+            <a:extLst>
+              <a:ext uri="{FF2B5EF4-FFF2-40B4-BE49-F238E27FC236}">
+                <a16:creationId xmlns:a16="http://schemas.microsoft.com/office/drawing/2014/main" id="{59F42753-4D2B-7067-2643-75750FCC9B0C}"/>
+              </a:ext>
+            </a:extLst>
+          </p:cNvPr>
+          <p:cNvSpPr txBox="1">
+            <a:spLocks/>
+          </p:cNvSpPr>
+          <p:nvPr/>
+        </p:nvSpPr>
+        <p:spPr>
+          <a:xfrm>
+            <a:off x="675088" y="5378498"/>
+            <a:ext cx="10933441" cy="896830"/>
+          </a:xfrm>
+          <a:prstGeom prst="rect">
+            <a:avLst/>
+          </a:prstGeom>
+          <a:solidFill>
+            <a:schemeClr val="bg1"/>
+          </a:solidFill>
+        </p:spPr>
         <p:txBody>
           <a:bodyPr vert="horz" lIns="91440" tIns="45720" rIns="91440" bIns="45720" rtlCol="0" anchor="ctr">
-            <a:normAutofit fontScale="70000" lnSpcReduction="20000"/>
+            <a:noAutofit/>
           </a:bodyPr>
           <a:lstStyle>
             <a:lvl1pPr marL="0" indent="0" algn="l" defTabSz="914400" rtl="0" eaLnBrk="1" latinLnBrk="0" hangingPunct="1">
@@ -6950,103 +6836,24 @@
           </a:lstStyle>
           <a:p>
             <a:r>
-              <a:rPr lang="fr-FR" dirty="0"/>
+              <a:rPr lang="fr-FR" sz="2000" dirty="0"/>
               <a:t>La complexité et l’erreur moyenne au carré atteignent leur minimum pour le même </a:t>
             </a:r>
             <a:r>
-              <a:rPr lang="fr-FR" dirty="0" err="1"/>
+              <a:rPr lang="fr-FR" sz="2000" dirty="0" err="1"/>
               <a:t>DEGRé</a:t>
             </a:r>
-            <a:endParaRPr lang="fr-FR" dirty="0"/>
-          </a:p>
-        </p:txBody>
-      </p:sp>
-      <p:pic>
-        <p:nvPicPr>
-          <p:cNvPr id="15" name="Image 14">
-            <a:extLst>
-              <a:ext uri="{FF2B5EF4-FFF2-40B4-BE49-F238E27FC236}">
-                <a16:creationId xmlns:a16="http://schemas.microsoft.com/office/drawing/2014/main" id="{870F87F3-C245-D6BA-65BD-5791774B7AD3}"/>
-              </a:ext>
-            </a:extLst>
-          </p:cNvPr>
-          <p:cNvPicPr>
-            <a:picLocks noChangeAspect="1"/>
-          </p:cNvPicPr>
-          <p:nvPr/>
-        </p:nvPicPr>
-        <p:blipFill>
-          <a:blip r:embed="rId3"/>
-          <a:stretch>
-            <a:fillRect/>
-          </a:stretch>
-        </p:blipFill>
-        <p:spPr>
-          <a:xfrm>
-            <a:off x="2556327" y="3895227"/>
-            <a:ext cx="9052202" cy="1871811"/>
-          </a:xfrm>
-          <a:prstGeom prst="rect">
-            <a:avLst/>
-          </a:prstGeom>
-        </p:spPr>
-      </p:pic>
-      <p:sp>
-        <p:nvSpPr>
-          <p:cNvPr id="16" name="ZoneTexte 15">
-            <a:extLst>
-              <a:ext uri="{FF2B5EF4-FFF2-40B4-BE49-F238E27FC236}">
-                <a16:creationId xmlns:a16="http://schemas.microsoft.com/office/drawing/2014/main" id="{F40FE2BF-D581-45D6-45CD-63256F9622C6}"/>
-              </a:ext>
-            </a:extLst>
-          </p:cNvPr>
-          <p:cNvSpPr txBox="1"/>
-          <p:nvPr/>
-        </p:nvSpPr>
-        <p:spPr>
-          <a:xfrm rot="20119868">
-            <a:off x="2180842" y="3431397"/>
-            <a:ext cx="6321422" cy="1569660"/>
-          </a:xfrm>
-          <a:prstGeom prst="rect">
-            <a:avLst/>
-          </a:prstGeom>
-          <a:noFill/>
-        </p:spPr>
-        <p:txBody>
-          <a:bodyPr wrap="square" rtlCol="0">
-            <a:spAutoFit/>
-          </a:bodyPr>
-          <a:lstStyle/>
-          <a:p>
-            <a:r>
-              <a:rPr lang="fr-FR" sz="4800" b="1" dirty="0">
-                <a:solidFill>
-                  <a:srgbClr val="FF0000"/>
-                </a:solidFill>
-              </a:rPr>
-              <a:t>A modifier avec le bon </a:t>
-            </a:r>
-            <a:r>
-              <a:rPr lang="fr-FR" sz="4800" b="1" dirty="0" err="1">
-                <a:solidFill>
-                  <a:srgbClr val="FF0000"/>
-                </a:solidFill>
-              </a:rPr>
-              <a:t>scaling</a:t>
-            </a:r>
-            <a:endParaRPr lang="fr-FR" sz="4800" b="1" dirty="0">
-              <a:solidFill>
-                <a:srgbClr val="FF0000"/>
-              </a:solidFill>
-            </a:endParaRPr>
+            <a:r>
+              <a:rPr lang="fr-FR" sz="2000" dirty="0"/>
+              <a:t> (3)</a:t>
+            </a:r>
           </a:p>
         </p:txBody>
       </p:sp>
     </p:spTree>
     <p:extLst>
       <p:ext uri="{BB962C8B-B14F-4D97-AF65-F5344CB8AC3E}">
-        <p14:creationId xmlns:p14="http://schemas.microsoft.com/office/powerpoint/2010/main" val="330572254"/>
+        <p14:creationId xmlns:p14="http://schemas.microsoft.com/office/powerpoint/2010/main" val="2846281353"/>
       </p:ext>
     </p:extLst>
   </p:cSld>
@@ -7057,7 +6864,7 @@
 </file>
 
 <file path=ppt/slides/slide6.xml><?xml version="1.0" encoding="utf-8"?>
-<p:sld xmlns:a="http://schemas.openxmlformats.org/drawingml/2006/main" xmlns:r="http://schemas.openxmlformats.org/officeDocument/2006/relationships" xmlns:p="http://schemas.openxmlformats.org/presentationml/2006/main" show="0">
+<p:sld xmlns:a="http://schemas.openxmlformats.org/drawingml/2006/main" xmlns:r="http://schemas.openxmlformats.org/officeDocument/2006/relationships" xmlns:p="http://schemas.openxmlformats.org/presentationml/2006/main">
   <p:cSld>
     <p:spTree>
       <p:nvGrpSpPr>
@@ -7075,10 +6882,10 @@
       </p:grpSpPr>
       <p:sp>
         <p:nvSpPr>
-          <p:cNvPr id="2" name="Titre 1">
-            <a:extLst>
-              <a:ext uri="{FF2B5EF4-FFF2-40B4-BE49-F238E27FC236}">
-                <a16:creationId xmlns:a16="http://schemas.microsoft.com/office/drawing/2014/main" id="{281F205B-B825-3C31-A65C-D68EC1D7FA40}"/>
+          <p:cNvPr id="12" name="Titre 11">
+            <a:extLst>
+              <a:ext uri="{FF2B5EF4-FFF2-40B4-BE49-F238E27FC236}">
+                <a16:creationId xmlns:a16="http://schemas.microsoft.com/office/drawing/2014/main" id="{99C2A587-3A80-F48F-81A6-5887DC116F4C}"/>
               </a:ext>
             </a:extLst>
           </p:cNvPr>
@@ -7096,44 +6903,288 @@
           <a:p>
             <a:r>
               <a:rPr lang="fr-FR" dirty="0"/>
-              <a:t>Slide cachée - Les résultats</a:t>
+              <a:t>Les résultats : Régression exponentielle</a:t>
+            </a:r>
+          </a:p>
+        </p:txBody>
+      </p:sp>
+      <p:sp>
+        <p:nvSpPr>
+          <p:cNvPr id="17" name="Espace réservé du texte 9">
+            <a:extLst>
+              <a:ext uri="{FF2B5EF4-FFF2-40B4-BE49-F238E27FC236}">
+                <a16:creationId xmlns:a16="http://schemas.microsoft.com/office/drawing/2014/main" id="{59F42753-4D2B-7067-2643-75750FCC9B0C}"/>
+              </a:ext>
+            </a:extLst>
+          </p:cNvPr>
+          <p:cNvSpPr txBox="1">
+            <a:spLocks/>
+          </p:cNvSpPr>
+          <p:nvPr/>
+        </p:nvSpPr>
+        <p:spPr>
+          <a:xfrm>
+            <a:off x="675088" y="5378498"/>
+            <a:ext cx="10933441" cy="896830"/>
+          </a:xfrm>
+          <a:prstGeom prst="rect">
+            <a:avLst/>
+          </a:prstGeom>
+          <a:solidFill>
+            <a:schemeClr val="bg1"/>
+          </a:solidFill>
+        </p:spPr>
+        <p:txBody>
+          <a:bodyPr vert="horz" lIns="91440" tIns="45720" rIns="91440" bIns="45720" rtlCol="0" anchor="ctr">
+            <a:noAutofit/>
+          </a:bodyPr>
+          <a:lstStyle>
+            <a:lvl1pPr marL="0" indent="0" algn="l" defTabSz="914400" rtl="0" eaLnBrk="1" latinLnBrk="0" hangingPunct="1">
+              <a:lnSpc>
+                <a:spcPct val="120000"/>
+              </a:lnSpc>
+              <a:spcBef>
+                <a:spcPts val="1000"/>
+              </a:spcBef>
+              <a:buSzPct val="80000"/>
+              <a:buFont typeface="Arial" panose="020B0604020202020204" pitchFamily="34" charset="0"/>
+              <a:buNone/>
+              <a:defRPr sz="1600" b="1" kern="1200" cap="all" spc="300" baseline="0">
+                <a:solidFill>
+                  <a:schemeClr val="tx1"/>
+                </a:solidFill>
+                <a:latin typeface="+mn-lt"/>
+                <a:ea typeface="+mn-ea"/>
+                <a:cs typeface="+mn-cs"/>
+              </a:defRPr>
+            </a:lvl1pPr>
+            <a:lvl2pPr marL="457200" indent="0" algn="l" defTabSz="914400" rtl="0" eaLnBrk="1" latinLnBrk="0" hangingPunct="1">
+              <a:lnSpc>
+                <a:spcPct val="120000"/>
+              </a:lnSpc>
+              <a:spcBef>
+                <a:spcPts val="500"/>
+              </a:spcBef>
+              <a:buSzPct val="80000"/>
+              <a:buFont typeface="Avenir Next LT Pro Light" panose="020B0304020202020204" pitchFamily="34" charset="0"/>
+              <a:buNone/>
+              <a:defRPr sz="2000" b="1" kern="1200">
+                <a:solidFill>
+                  <a:schemeClr val="tx1"/>
+                </a:solidFill>
+                <a:latin typeface="+mn-lt"/>
+                <a:ea typeface="+mn-ea"/>
+                <a:cs typeface="+mn-cs"/>
+              </a:defRPr>
+            </a:lvl2pPr>
+            <a:lvl3pPr marL="914400" indent="0" algn="l" defTabSz="914400" rtl="0" eaLnBrk="1" latinLnBrk="0" hangingPunct="1">
+              <a:lnSpc>
+                <a:spcPct val="120000"/>
+              </a:lnSpc>
+              <a:spcBef>
+                <a:spcPts val="500"/>
+              </a:spcBef>
+              <a:buSzPct val="80000"/>
+              <a:buFont typeface="Arial" panose="020B0604020202020204" pitchFamily="34" charset="0"/>
+              <a:buNone/>
+              <a:defRPr sz="1800" b="1" kern="1200">
+                <a:solidFill>
+                  <a:schemeClr val="tx1"/>
+                </a:solidFill>
+                <a:latin typeface="+mn-lt"/>
+                <a:ea typeface="+mn-ea"/>
+                <a:cs typeface="+mn-cs"/>
+              </a:defRPr>
+            </a:lvl3pPr>
+            <a:lvl4pPr marL="1371600" indent="0" algn="l" defTabSz="914400" rtl="0" eaLnBrk="1" latinLnBrk="0" hangingPunct="1">
+              <a:lnSpc>
+                <a:spcPct val="120000"/>
+              </a:lnSpc>
+              <a:spcBef>
+                <a:spcPts val="500"/>
+              </a:spcBef>
+              <a:buSzPct val="80000"/>
+              <a:buFont typeface="Avenir Next LT Pro Light" panose="020B0304020202020204" pitchFamily="34" charset="0"/>
+              <a:buNone/>
+              <a:defRPr sz="1600" b="1" kern="1200">
+                <a:solidFill>
+                  <a:schemeClr val="tx1"/>
+                </a:solidFill>
+                <a:latin typeface="+mn-lt"/>
+                <a:ea typeface="+mn-ea"/>
+                <a:cs typeface="+mn-cs"/>
+              </a:defRPr>
+            </a:lvl4pPr>
+            <a:lvl5pPr marL="1828800" indent="0" algn="l" defTabSz="914400" rtl="0" eaLnBrk="1" latinLnBrk="0" hangingPunct="1">
+              <a:lnSpc>
+                <a:spcPct val="120000"/>
+              </a:lnSpc>
+              <a:spcBef>
+                <a:spcPts val="500"/>
+              </a:spcBef>
+              <a:buSzPct val="80000"/>
+              <a:buFont typeface="Arial" panose="020B0604020202020204" pitchFamily="34" charset="0"/>
+              <a:buNone/>
+              <a:defRPr sz="1600" b="1" kern="1200">
+                <a:solidFill>
+                  <a:schemeClr val="tx1"/>
+                </a:solidFill>
+                <a:latin typeface="+mn-lt"/>
+                <a:ea typeface="+mn-ea"/>
+                <a:cs typeface="+mn-cs"/>
+              </a:defRPr>
+            </a:lvl5pPr>
+            <a:lvl6pPr marL="2286000" indent="0" algn="l" defTabSz="914400" rtl="0" eaLnBrk="1" latinLnBrk="0" hangingPunct="1">
+              <a:lnSpc>
+                <a:spcPct val="90000"/>
+              </a:lnSpc>
+              <a:spcBef>
+                <a:spcPts val="500"/>
+              </a:spcBef>
+              <a:buFont typeface="Arial" panose="020B0604020202020204" pitchFamily="34" charset="0"/>
+              <a:buNone/>
+              <a:defRPr sz="1600" b="1" kern="1200">
+                <a:solidFill>
+                  <a:schemeClr val="tx1"/>
+                </a:solidFill>
+                <a:latin typeface="+mn-lt"/>
+                <a:ea typeface="+mn-ea"/>
+                <a:cs typeface="+mn-cs"/>
+              </a:defRPr>
+            </a:lvl6pPr>
+            <a:lvl7pPr marL="2743200" indent="0" algn="l" defTabSz="914400" rtl="0" eaLnBrk="1" latinLnBrk="0" hangingPunct="1">
+              <a:lnSpc>
+                <a:spcPct val="90000"/>
+              </a:lnSpc>
+              <a:spcBef>
+                <a:spcPts val="500"/>
+              </a:spcBef>
+              <a:buFont typeface="Arial" panose="020B0604020202020204" pitchFamily="34" charset="0"/>
+              <a:buNone/>
+              <a:defRPr sz="1600" b="1" kern="1200">
+                <a:solidFill>
+                  <a:schemeClr val="tx1"/>
+                </a:solidFill>
+                <a:latin typeface="+mn-lt"/>
+                <a:ea typeface="+mn-ea"/>
+                <a:cs typeface="+mn-cs"/>
+              </a:defRPr>
+            </a:lvl7pPr>
+            <a:lvl8pPr marL="3200400" indent="0" algn="l" defTabSz="914400" rtl="0" eaLnBrk="1" latinLnBrk="0" hangingPunct="1">
+              <a:lnSpc>
+                <a:spcPct val="90000"/>
+              </a:lnSpc>
+              <a:spcBef>
+                <a:spcPts val="500"/>
+              </a:spcBef>
+              <a:buFont typeface="Arial" panose="020B0604020202020204" pitchFamily="34" charset="0"/>
+              <a:buNone/>
+              <a:defRPr sz="1600" b="1" kern="1200">
+                <a:solidFill>
+                  <a:schemeClr val="tx1"/>
+                </a:solidFill>
+                <a:latin typeface="+mn-lt"/>
+                <a:ea typeface="+mn-ea"/>
+                <a:cs typeface="+mn-cs"/>
+              </a:defRPr>
+            </a:lvl8pPr>
+            <a:lvl9pPr marL="3657600" indent="0" algn="l" defTabSz="914400" rtl="0" eaLnBrk="1" latinLnBrk="0" hangingPunct="1">
+              <a:lnSpc>
+                <a:spcPct val="90000"/>
+              </a:lnSpc>
+              <a:spcBef>
+                <a:spcPts val="500"/>
+              </a:spcBef>
+              <a:buFont typeface="Arial" panose="020B0604020202020204" pitchFamily="34" charset="0"/>
+              <a:buNone/>
+              <a:defRPr sz="1600" b="1" kern="1200">
+                <a:solidFill>
+                  <a:schemeClr val="tx1"/>
+                </a:solidFill>
+                <a:latin typeface="+mn-lt"/>
+                <a:ea typeface="+mn-ea"/>
+                <a:cs typeface="+mn-cs"/>
+              </a:defRPr>
+            </a:lvl9pPr>
+          </a:lstStyle>
+          <a:p>
+            <a:r>
+              <a:rPr lang="fr-FR" sz="2000" dirty="0"/>
+              <a:t>La complexité et l’erreur moyenne au carré atteignent leur minimum pour UN </a:t>
+            </a:r>
+            <a:r>
+              <a:rPr lang="fr-FR" sz="2000" dirty="0" err="1"/>
+              <a:t>DEGRé</a:t>
+            </a:r>
+            <a:r>
+              <a:rPr lang="fr-FR" sz="2000" dirty="0"/>
+              <a:t> proche (5 et 6)</a:t>
             </a:r>
           </a:p>
         </p:txBody>
       </p:sp>
       <p:pic>
         <p:nvPicPr>
-          <p:cNvPr id="5" name="Espace réservé du contenu 4" descr="Une image contenant ligne, Tracé, texte, diagramme&#10;&#10;Description générée automatiquement">
-            <a:extLst>
-              <a:ext uri="{FF2B5EF4-FFF2-40B4-BE49-F238E27FC236}">
-                <a16:creationId xmlns:a16="http://schemas.microsoft.com/office/drawing/2014/main" id="{EB2795AE-DAB8-C444-DD1E-5C2589A5D359}"/>
+          <p:cNvPr id="3" name="Image 2">
+            <a:extLst>
+              <a:ext uri="{FF2B5EF4-FFF2-40B4-BE49-F238E27FC236}">
+                <a16:creationId xmlns:a16="http://schemas.microsoft.com/office/drawing/2014/main" id="{2E88E432-2BEF-08FB-8DE1-54A099BD978E}"/>
               </a:ext>
             </a:extLst>
           </p:cNvPr>
           <p:cNvPicPr>
-            <a:picLocks noGrp="1" noChangeAspect="1"/>
+            <a:picLocks noChangeAspect="1"/>
           </p:cNvPicPr>
-          <p:nvPr>
-            <p:ph idx="1"/>
-          </p:nvPr>
+          <p:nvPr/>
         </p:nvPicPr>
-        <p:blipFill>
+        <p:blipFill rotWithShape="1">
           <a:blip r:embed="rId2"/>
-          <a:stretch>
-            <a:fillRect/>
-          </a:stretch>
+          <a:srcRect t="1183" b="-1"/>
+          <a:stretch/>
         </p:blipFill>
         <p:spPr>
           <a:xfrm>
-            <a:off x="2967743" y="2076450"/>
-            <a:ext cx="6267627" cy="3910013"/>
-          </a:xfrm>
+            <a:off x="594791" y="2126512"/>
+            <a:ext cx="5453084" cy="3107451"/>
+          </a:xfrm>
+          <a:prstGeom prst="rect">
+            <a:avLst/>
+          </a:prstGeom>
+        </p:spPr>
+      </p:pic>
+      <p:pic>
+        <p:nvPicPr>
+          <p:cNvPr id="6" name="Image 5">
+            <a:extLst>
+              <a:ext uri="{FF2B5EF4-FFF2-40B4-BE49-F238E27FC236}">
+                <a16:creationId xmlns:a16="http://schemas.microsoft.com/office/drawing/2014/main" id="{0367B611-EEF9-3FA4-4E49-5BB08AA8DC15}"/>
+              </a:ext>
+            </a:extLst>
+          </p:cNvPr>
+          <p:cNvPicPr>
+            <a:picLocks noChangeAspect="1"/>
+          </p:cNvPicPr>
+          <p:nvPr/>
+        </p:nvPicPr>
+        <p:blipFill rotWithShape="1">
+          <a:blip r:embed="rId3"/>
+          <a:srcRect l="3065" t="1749"/>
+          <a:stretch/>
+        </p:blipFill>
+        <p:spPr>
+          <a:xfrm>
+            <a:off x="6257676" y="2059388"/>
+            <a:ext cx="5453084" cy="3189195"/>
+          </a:xfrm>
+          <a:prstGeom prst="rect">
+            <a:avLst/>
+          </a:prstGeom>
         </p:spPr>
       </p:pic>
     </p:spTree>
     <p:extLst>
       <p:ext uri="{BB962C8B-B14F-4D97-AF65-F5344CB8AC3E}">
-        <p14:creationId xmlns:p14="http://schemas.microsoft.com/office/powerpoint/2010/main" val="241605847"/>
+        <p14:creationId xmlns:p14="http://schemas.microsoft.com/office/powerpoint/2010/main" val="1997314004"/>
       </p:ext>
     </p:extLst>
   </p:cSld>
@@ -7162,10 +7213,10 @@
       </p:grpSpPr>
       <p:sp>
         <p:nvSpPr>
-          <p:cNvPr id="2" name="Titre 1">
-            <a:extLst>
-              <a:ext uri="{FF2B5EF4-FFF2-40B4-BE49-F238E27FC236}">
-                <a16:creationId xmlns:a16="http://schemas.microsoft.com/office/drawing/2014/main" id="{281F205B-B825-3C31-A65C-D68EC1D7FA40}"/>
+          <p:cNvPr id="12" name="Titre 11">
+            <a:extLst>
+              <a:ext uri="{FF2B5EF4-FFF2-40B4-BE49-F238E27FC236}">
+                <a16:creationId xmlns:a16="http://schemas.microsoft.com/office/drawing/2014/main" id="{99C2A587-3A80-F48F-81A6-5887DC116F4C}"/>
               </a:ext>
             </a:extLst>
           </p:cNvPr>
@@ -7183,44 +7234,333 @@
           <a:p>
             <a:r>
               <a:rPr lang="fr-FR" dirty="0"/>
-              <a:t>Slide cachée - Les résultats</a:t>
+              <a:t>Les résultats : Régression logarithmique</a:t>
+            </a:r>
+          </a:p>
+        </p:txBody>
+      </p:sp>
+      <p:sp>
+        <p:nvSpPr>
+          <p:cNvPr id="17" name="Espace réservé du texte 9">
+            <a:extLst>
+              <a:ext uri="{FF2B5EF4-FFF2-40B4-BE49-F238E27FC236}">
+                <a16:creationId xmlns:a16="http://schemas.microsoft.com/office/drawing/2014/main" id="{59F42753-4D2B-7067-2643-75750FCC9B0C}"/>
+              </a:ext>
+            </a:extLst>
+          </p:cNvPr>
+          <p:cNvSpPr txBox="1">
+            <a:spLocks/>
+          </p:cNvSpPr>
+          <p:nvPr/>
+        </p:nvSpPr>
+        <p:spPr>
+          <a:xfrm>
+            <a:off x="675088" y="5378498"/>
+            <a:ext cx="10933441" cy="896830"/>
+          </a:xfrm>
+          <a:prstGeom prst="rect">
+            <a:avLst/>
+          </a:prstGeom>
+          <a:solidFill>
+            <a:schemeClr val="bg1"/>
+          </a:solidFill>
+        </p:spPr>
+        <p:txBody>
+          <a:bodyPr vert="horz" lIns="91440" tIns="45720" rIns="91440" bIns="45720" rtlCol="0" anchor="ctr">
+            <a:noAutofit/>
+          </a:bodyPr>
+          <a:lstStyle>
+            <a:lvl1pPr marL="0" indent="0" algn="l" defTabSz="914400" rtl="0" eaLnBrk="1" latinLnBrk="0" hangingPunct="1">
+              <a:lnSpc>
+                <a:spcPct val="120000"/>
+              </a:lnSpc>
+              <a:spcBef>
+                <a:spcPts val="1000"/>
+              </a:spcBef>
+              <a:buSzPct val="80000"/>
+              <a:buFont typeface="Arial" panose="020B0604020202020204" pitchFamily="34" charset="0"/>
+              <a:buNone/>
+              <a:defRPr sz="1600" b="1" kern="1200" cap="all" spc="300" baseline="0">
+                <a:solidFill>
+                  <a:schemeClr val="tx1"/>
+                </a:solidFill>
+                <a:latin typeface="+mn-lt"/>
+                <a:ea typeface="+mn-ea"/>
+                <a:cs typeface="+mn-cs"/>
+              </a:defRPr>
+            </a:lvl1pPr>
+            <a:lvl2pPr marL="457200" indent="0" algn="l" defTabSz="914400" rtl="0" eaLnBrk="1" latinLnBrk="0" hangingPunct="1">
+              <a:lnSpc>
+                <a:spcPct val="120000"/>
+              </a:lnSpc>
+              <a:spcBef>
+                <a:spcPts val="500"/>
+              </a:spcBef>
+              <a:buSzPct val="80000"/>
+              <a:buFont typeface="Avenir Next LT Pro Light" panose="020B0304020202020204" pitchFamily="34" charset="0"/>
+              <a:buNone/>
+              <a:defRPr sz="2000" b="1" kern="1200">
+                <a:solidFill>
+                  <a:schemeClr val="tx1"/>
+                </a:solidFill>
+                <a:latin typeface="+mn-lt"/>
+                <a:ea typeface="+mn-ea"/>
+                <a:cs typeface="+mn-cs"/>
+              </a:defRPr>
+            </a:lvl2pPr>
+            <a:lvl3pPr marL="914400" indent="0" algn="l" defTabSz="914400" rtl="0" eaLnBrk="1" latinLnBrk="0" hangingPunct="1">
+              <a:lnSpc>
+                <a:spcPct val="120000"/>
+              </a:lnSpc>
+              <a:spcBef>
+                <a:spcPts val="500"/>
+              </a:spcBef>
+              <a:buSzPct val="80000"/>
+              <a:buFont typeface="Arial" panose="020B0604020202020204" pitchFamily="34" charset="0"/>
+              <a:buNone/>
+              <a:defRPr sz="1800" b="1" kern="1200">
+                <a:solidFill>
+                  <a:schemeClr val="tx1"/>
+                </a:solidFill>
+                <a:latin typeface="+mn-lt"/>
+                <a:ea typeface="+mn-ea"/>
+                <a:cs typeface="+mn-cs"/>
+              </a:defRPr>
+            </a:lvl3pPr>
+            <a:lvl4pPr marL="1371600" indent="0" algn="l" defTabSz="914400" rtl="0" eaLnBrk="1" latinLnBrk="0" hangingPunct="1">
+              <a:lnSpc>
+                <a:spcPct val="120000"/>
+              </a:lnSpc>
+              <a:spcBef>
+                <a:spcPts val="500"/>
+              </a:spcBef>
+              <a:buSzPct val="80000"/>
+              <a:buFont typeface="Avenir Next LT Pro Light" panose="020B0304020202020204" pitchFamily="34" charset="0"/>
+              <a:buNone/>
+              <a:defRPr sz="1600" b="1" kern="1200">
+                <a:solidFill>
+                  <a:schemeClr val="tx1"/>
+                </a:solidFill>
+                <a:latin typeface="+mn-lt"/>
+                <a:ea typeface="+mn-ea"/>
+                <a:cs typeface="+mn-cs"/>
+              </a:defRPr>
+            </a:lvl4pPr>
+            <a:lvl5pPr marL="1828800" indent="0" algn="l" defTabSz="914400" rtl="0" eaLnBrk="1" latinLnBrk="0" hangingPunct="1">
+              <a:lnSpc>
+                <a:spcPct val="120000"/>
+              </a:lnSpc>
+              <a:spcBef>
+                <a:spcPts val="500"/>
+              </a:spcBef>
+              <a:buSzPct val="80000"/>
+              <a:buFont typeface="Arial" panose="020B0604020202020204" pitchFamily="34" charset="0"/>
+              <a:buNone/>
+              <a:defRPr sz="1600" b="1" kern="1200">
+                <a:solidFill>
+                  <a:schemeClr val="tx1"/>
+                </a:solidFill>
+                <a:latin typeface="+mn-lt"/>
+                <a:ea typeface="+mn-ea"/>
+                <a:cs typeface="+mn-cs"/>
+              </a:defRPr>
+            </a:lvl5pPr>
+            <a:lvl6pPr marL="2286000" indent="0" algn="l" defTabSz="914400" rtl="0" eaLnBrk="1" latinLnBrk="0" hangingPunct="1">
+              <a:lnSpc>
+                <a:spcPct val="90000"/>
+              </a:lnSpc>
+              <a:spcBef>
+                <a:spcPts val="500"/>
+              </a:spcBef>
+              <a:buFont typeface="Arial" panose="020B0604020202020204" pitchFamily="34" charset="0"/>
+              <a:buNone/>
+              <a:defRPr sz="1600" b="1" kern="1200">
+                <a:solidFill>
+                  <a:schemeClr val="tx1"/>
+                </a:solidFill>
+                <a:latin typeface="+mn-lt"/>
+                <a:ea typeface="+mn-ea"/>
+                <a:cs typeface="+mn-cs"/>
+              </a:defRPr>
+            </a:lvl6pPr>
+            <a:lvl7pPr marL="2743200" indent="0" algn="l" defTabSz="914400" rtl="0" eaLnBrk="1" latinLnBrk="0" hangingPunct="1">
+              <a:lnSpc>
+                <a:spcPct val="90000"/>
+              </a:lnSpc>
+              <a:spcBef>
+                <a:spcPts val="500"/>
+              </a:spcBef>
+              <a:buFont typeface="Arial" panose="020B0604020202020204" pitchFamily="34" charset="0"/>
+              <a:buNone/>
+              <a:defRPr sz="1600" b="1" kern="1200">
+                <a:solidFill>
+                  <a:schemeClr val="tx1"/>
+                </a:solidFill>
+                <a:latin typeface="+mn-lt"/>
+                <a:ea typeface="+mn-ea"/>
+                <a:cs typeface="+mn-cs"/>
+              </a:defRPr>
+            </a:lvl7pPr>
+            <a:lvl8pPr marL="3200400" indent="0" algn="l" defTabSz="914400" rtl="0" eaLnBrk="1" latinLnBrk="0" hangingPunct="1">
+              <a:lnSpc>
+                <a:spcPct val="90000"/>
+              </a:lnSpc>
+              <a:spcBef>
+                <a:spcPts val="500"/>
+              </a:spcBef>
+              <a:buFont typeface="Arial" panose="020B0604020202020204" pitchFamily="34" charset="0"/>
+              <a:buNone/>
+              <a:defRPr sz="1600" b="1" kern="1200">
+                <a:solidFill>
+                  <a:schemeClr val="tx1"/>
+                </a:solidFill>
+                <a:latin typeface="+mn-lt"/>
+                <a:ea typeface="+mn-ea"/>
+                <a:cs typeface="+mn-cs"/>
+              </a:defRPr>
+            </a:lvl8pPr>
+            <a:lvl9pPr marL="3657600" indent="0" algn="l" defTabSz="914400" rtl="0" eaLnBrk="1" latinLnBrk="0" hangingPunct="1">
+              <a:lnSpc>
+                <a:spcPct val="90000"/>
+              </a:lnSpc>
+              <a:spcBef>
+                <a:spcPts val="500"/>
+              </a:spcBef>
+              <a:buFont typeface="Arial" panose="020B0604020202020204" pitchFamily="34" charset="0"/>
+              <a:buNone/>
+              <a:defRPr sz="1600" b="1" kern="1200">
+                <a:solidFill>
+                  <a:schemeClr val="tx1"/>
+                </a:solidFill>
+                <a:latin typeface="+mn-lt"/>
+                <a:ea typeface="+mn-ea"/>
+                <a:cs typeface="+mn-cs"/>
+              </a:defRPr>
+            </a:lvl9pPr>
+          </a:lstStyle>
+          <a:p>
+            <a:r>
+              <a:rPr lang="fr-FR" sz="2000" dirty="0"/>
+              <a:t>XXX</a:t>
             </a:r>
           </a:p>
         </p:txBody>
       </p:sp>
       <p:pic>
         <p:nvPicPr>
-          <p:cNvPr id="7" name="Espace réservé du contenu 6" descr="Une image contenant ligne, Tracé, diagramme, texte&#10;&#10;Description générée automatiquement">
-            <a:extLst>
-              <a:ext uri="{FF2B5EF4-FFF2-40B4-BE49-F238E27FC236}">
-                <a16:creationId xmlns:a16="http://schemas.microsoft.com/office/drawing/2014/main" id="{90FED60A-F269-D4FB-491E-100D77786FA1}"/>
+          <p:cNvPr id="3" name="Image 2">
+            <a:extLst>
+              <a:ext uri="{FF2B5EF4-FFF2-40B4-BE49-F238E27FC236}">
+                <a16:creationId xmlns:a16="http://schemas.microsoft.com/office/drawing/2014/main" id="{4B7BBD64-7DA1-A7C8-69A2-B9D410EA8047}"/>
               </a:ext>
             </a:extLst>
           </p:cNvPr>
           <p:cNvPicPr>
-            <a:picLocks noGrp="1" noChangeAspect="1"/>
+            <a:picLocks noChangeAspect="1"/>
           </p:cNvPicPr>
-          <p:nvPr>
-            <p:ph idx="1"/>
-          </p:nvPr>
+          <p:nvPr/>
+        </p:nvPicPr>
+        <p:blipFill rotWithShape="1">
+          <a:blip r:embed="rId2"/>
+          <a:srcRect l="551" t="857"/>
+          <a:stretch/>
+        </p:blipFill>
+        <p:spPr>
+          <a:xfrm>
+            <a:off x="704088" y="2083981"/>
+            <a:ext cx="5231491" cy="3348747"/>
+          </a:xfrm>
+          <a:prstGeom prst="rect">
+            <a:avLst/>
+          </a:prstGeom>
+        </p:spPr>
+      </p:pic>
+      <p:pic>
+        <p:nvPicPr>
+          <p:cNvPr id="4" name="Image 3">
+            <a:extLst>
+              <a:ext uri="{FF2B5EF4-FFF2-40B4-BE49-F238E27FC236}">
+                <a16:creationId xmlns:a16="http://schemas.microsoft.com/office/drawing/2014/main" id="{0AB0B388-D030-B0B9-9813-9CB24887C18E}"/>
+              </a:ext>
+            </a:extLst>
+          </p:cNvPr>
+          <p:cNvPicPr>
+            <a:picLocks noChangeAspect="1"/>
+          </p:cNvPicPr>
+          <p:nvPr/>
         </p:nvPicPr>
         <p:blipFill>
-          <a:blip r:embed="rId2"/>
+          <a:blip r:embed="rId3"/>
           <a:stretch>
             <a:fillRect/>
           </a:stretch>
         </p:blipFill>
         <p:spPr>
           <a:xfrm>
-            <a:off x="2865454" y="2076450"/>
-            <a:ext cx="6472205" cy="3910013"/>
-          </a:xfrm>
+            <a:off x="6141807" y="2122924"/>
+            <a:ext cx="5466721" cy="3192041"/>
+          </a:xfrm>
+          <a:prstGeom prst="rect">
+            <a:avLst/>
+          </a:prstGeom>
         </p:spPr>
       </p:pic>
+      <p:sp>
+        <p:nvSpPr>
+          <p:cNvPr id="5" name="Rectangle 4">
+            <a:extLst>
+              <a:ext uri="{FF2B5EF4-FFF2-40B4-BE49-F238E27FC236}">
+                <a16:creationId xmlns:a16="http://schemas.microsoft.com/office/drawing/2014/main" id="{0C4CB72E-C1DD-97CF-9076-37710D29D4B2}"/>
+              </a:ext>
+            </a:extLst>
+          </p:cNvPr>
+          <p:cNvSpPr/>
+          <p:nvPr/>
+        </p:nvSpPr>
+        <p:spPr>
+          <a:xfrm>
+            <a:off x="7429500" y="1968500"/>
+            <a:ext cx="2743200" cy="266700"/>
+          </a:xfrm>
+          <a:prstGeom prst="rect">
+            <a:avLst/>
+          </a:prstGeom>
+          <a:solidFill>
+            <a:schemeClr val="bg1"/>
+          </a:solidFill>
+          <a:ln>
+            <a:noFill/>
+          </a:ln>
+        </p:spPr>
+        <p:style>
+          <a:lnRef idx="2">
+            <a:schemeClr val="accent1">
+              <a:shade val="15000"/>
+            </a:schemeClr>
+          </a:lnRef>
+          <a:fillRef idx="1">
+            <a:schemeClr val="accent1"/>
+          </a:fillRef>
+          <a:effectRef idx="0">
+            <a:schemeClr val="accent1"/>
+          </a:effectRef>
+          <a:fontRef idx="minor">
+            <a:schemeClr val="lt1"/>
+          </a:fontRef>
+        </p:style>
+        <p:txBody>
+          <a:bodyPr rtlCol="0" anchor="ctr"/>
+          <a:lstStyle/>
+          <a:p>
+            <a:pPr algn="ctr"/>
+            <a:endParaRPr lang="fr-FR"/>
+          </a:p>
+        </p:txBody>
+      </p:sp>
     </p:spTree>
     <p:extLst>
       <p:ext uri="{BB962C8B-B14F-4D97-AF65-F5344CB8AC3E}">
-        <p14:creationId xmlns:p14="http://schemas.microsoft.com/office/powerpoint/2010/main" val="3853918140"/>
+        <p14:creationId xmlns:p14="http://schemas.microsoft.com/office/powerpoint/2010/main" val="251217864"/>
       </p:ext>
     </p:extLst>
   </p:cSld>
@@ -7270,17 +7610,17 @@
           <a:p>
             <a:r>
               <a:rPr lang="fr-FR" dirty="0"/>
-              <a:t>Slide cachée - Les résultats</a:t>
+              <a:t>Slide cachée</a:t>
             </a:r>
           </a:p>
         </p:txBody>
       </p:sp>
       <p:pic>
         <p:nvPicPr>
-          <p:cNvPr id="7" name="Espace réservé du contenu 6" descr="Une image contenant ligne, Tracé, diagramme, pente&#10;&#10;Description générée automatiquement">
-            <a:extLst>
-              <a:ext uri="{FF2B5EF4-FFF2-40B4-BE49-F238E27FC236}">
-                <a16:creationId xmlns:a16="http://schemas.microsoft.com/office/drawing/2014/main" id="{9DEF85CA-5C55-BEE5-49BB-BAC9C0A2A719}"/>
+          <p:cNvPr id="5" name="Espace réservé du contenu 4" descr="Une image contenant ligne, Tracé, texte, diagramme&#10;&#10;Description générée automatiquement">
+            <a:extLst>
+              <a:ext uri="{FF2B5EF4-FFF2-40B4-BE49-F238E27FC236}">
+                <a16:creationId xmlns:a16="http://schemas.microsoft.com/office/drawing/2014/main" id="{EB2795AE-DAB8-C444-DD1E-5C2589A5D359}"/>
               </a:ext>
             </a:extLst>
           </p:cNvPr>
@@ -7292,22 +7632,22 @@
           </p:nvPr>
         </p:nvPicPr>
         <p:blipFill>
-          <a:blip r:embed="rId3"/>
+          <a:blip r:embed="rId2"/>
           <a:stretch>
             <a:fillRect/>
           </a:stretch>
         </p:blipFill>
         <p:spPr>
           <a:xfrm>
-            <a:off x="2860303" y="2076450"/>
-            <a:ext cx="6482507" cy="3910013"/>
+            <a:off x="2967743" y="2076450"/>
+            <a:ext cx="6267627" cy="3910013"/>
           </a:xfrm>
         </p:spPr>
       </p:pic>
     </p:spTree>
     <p:extLst>
       <p:ext uri="{BB962C8B-B14F-4D97-AF65-F5344CB8AC3E}">
-        <p14:creationId xmlns:p14="http://schemas.microsoft.com/office/powerpoint/2010/main" val="283963290"/>
+        <p14:creationId xmlns:p14="http://schemas.microsoft.com/office/powerpoint/2010/main" val="241605847"/>
       </p:ext>
     </p:extLst>
   </p:cSld>

</xml_diff>

<commit_message>
[DEV_MODEL]: model_tuning.py final debugging, Soutenance.pptx minor corrections
</commit_message>
<xml_diff>
--- a/Soutenance.pptx
+++ b/Soutenance.pptx
@@ -6429,7 +6429,7 @@
         <p:spPr>
           <a:xfrm>
             <a:off x="7708900" y="1944468"/>
-            <a:ext cx="3940175" cy="3139321"/>
+            <a:ext cx="3940175" cy="3693319"/>
           </a:xfrm>
           <a:prstGeom prst="rect">
             <a:avLst/>
@@ -6508,11 +6508,13 @@
             </a:r>
             <a:r>
               <a:rPr lang="fr-FR" b="1" dirty="0"/>
-              <a:t>modèles polynomiaux et exponentiels</a:t>
-            </a:r>
+              <a:t>modèles polynomiaux et exponentiels </a:t>
+            </a:r>
+          </a:p>
+          <a:p>
             <a:r>
               <a:rPr lang="fr-FR" dirty="0"/>
-              <a:t>.</a:t>
+              <a:t>(le logarithme n’est pas approprié à ce set de données)</a:t>
             </a:r>
           </a:p>
         </p:txBody>
@@ -7229,9 +7231,18 @@
         </p:nvSpPr>
         <p:spPr/>
         <p:txBody>
-          <a:bodyPr/>
+          <a:bodyPr>
+            <a:normAutofit fontScale="90000"/>
+          </a:bodyPr>
           <a:lstStyle/>
           <a:p>
+            <a:r>
+              <a:rPr lang="fr-FR" dirty="0"/>
+              <a:t>Backup</a:t>
+            </a:r>
+            <a:br>
+              <a:rPr lang="fr-FR" dirty="0"/>
+            </a:br>
             <a:r>
               <a:rPr lang="fr-FR" dirty="0"/>
               <a:t>Les résultats : Régression logarithmique</a:t>
@@ -7441,7 +7452,7 @@
           <a:p>
             <a:r>
               <a:rPr lang="fr-FR" sz="2000" dirty="0"/>
-              <a:t>XXX</a:t>
+              <a:t>Nous avons la confirmation que La régression logarithmique  ne correspond pas au set de données</a:t>
             </a:r>
           </a:p>
         </p:txBody>
@@ -7554,6 +7565,41 @@
           <a:p>
             <a:pPr algn="ctr"/>
             <a:endParaRPr lang="fr-FR"/>
+          </a:p>
+        </p:txBody>
+      </p:sp>
+      <p:sp>
+        <p:nvSpPr>
+          <p:cNvPr id="2" name="ZoneTexte 1">
+            <a:extLst>
+              <a:ext uri="{FF2B5EF4-FFF2-40B4-BE49-F238E27FC236}">
+                <a16:creationId xmlns:a16="http://schemas.microsoft.com/office/drawing/2014/main" id="{89DEC7C7-9FE6-0B17-2E6B-083A3EB2FA4F}"/>
+              </a:ext>
+            </a:extLst>
+          </p:cNvPr>
+          <p:cNvSpPr txBox="1"/>
+          <p:nvPr/>
+        </p:nvSpPr>
+        <p:spPr>
+          <a:xfrm>
+            <a:off x="542924" y="85060"/>
+            <a:ext cx="5655857" cy="369332"/>
+          </a:xfrm>
+          <a:prstGeom prst="rect">
+            <a:avLst/>
+          </a:prstGeom>
+          <a:noFill/>
+        </p:spPr>
+        <p:txBody>
+          <a:bodyPr wrap="square" rtlCol="0">
+            <a:spAutoFit/>
+          </a:bodyPr>
+          <a:lstStyle/>
+          <a:p>
+            <a:r>
+              <a:rPr lang="fr-FR" dirty="0"/>
+              <a:t>Backup : à ne montrer que si nécessaire</a:t>
+            </a:r>
           </a:p>
         </p:txBody>
       </p:sp>
@@ -7605,12 +7651,14 @@
         </p:nvSpPr>
         <p:spPr/>
         <p:txBody>
-          <a:bodyPr/>
+          <a:bodyPr>
+            <a:noAutofit/>
+          </a:bodyPr>
           <a:lstStyle/>
           <a:p>
             <a:r>
-              <a:rPr lang="fr-FR" dirty="0"/>
-              <a:t>Slide cachée</a:t>
+              <a:rPr lang="fr-FR" sz="3200" dirty="0"/>
+              <a:t>Backup : Analyse de la complexité avec avec différents nombres de valeurs décimales des paramètres </a:t>
             </a:r>
           </a:p>
         </p:txBody>
@@ -7639,11 +7687,394 @@
         </p:blipFill>
         <p:spPr>
           <a:xfrm>
-            <a:off x="2967743" y="2076450"/>
+            <a:off x="447823" y="2076450"/>
             <a:ext cx="6267627" cy="3910013"/>
           </a:xfrm>
         </p:spPr>
       </p:pic>
+      <p:sp>
+        <p:nvSpPr>
+          <p:cNvPr id="3" name="ZoneTexte 2">
+            <a:extLst>
+              <a:ext uri="{FF2B5EF4-FFF2-40B4-BE49-F238E27FC236}">
+                <a16:creationId xmlns:a16="http://schemas.microsoft.com/office/drawing/2014/main" id="{E4DE06A9-765C-B95A-BDFF-3A58F9CD41FD}"/>
+              </a:ext>
+            </a:extLst>
+          </p:cNvPr>
+          <p:cNvSpPr txBox="1"/>
+          <p:nvPr/>
+        </p:nvSpPr>
+        <p:spPr>
+          <a:xfrm>
+            <a:off x="542924" y="85060"/>
+            <a:ext cx="5655857" cy="369332"/>
+          </a:xfrm>
+          <a:prstGeom prst="rect">
+            <a:avLst/>
+          </a:prstGeom>
+          <a:noFill/>
+        </p:spPr>
+        <p:txBody>
+          <a:bodyPr wrap="square" rtlCol="0">
+            <a:spAutoFit/>
+          </a:bodyPr>
+          <a:lstStyle/>
+          <a:p>
+            <a:r>
+              <a:rPr lang="fr-FR" dirty="0"/>
+              <a:t>Backup : à ne montrer que si nécessaire</a:t>
+            </a:r>
+          </a:p>
+        </p:txBody>
+      </p:sp>
+      <p:sp>
+        <p:nvSpPr>
+          <p:cNvPr id="4" name="Espace réservé du texte 9">
+            <a:extLst>
+              <a:ext uri="{FF2B5EF4-FFF2-40B4-BE49-F238E27FC236}">
+                <a16:creationId xmlns:a16="http://schemas.microsoft.com/office/drawing/2014/main" id="{DA2B698E-BEE4-F477-9AD4-0FB9927AB428}"/>
+              </a:ext>
+            </a:extLst>
+          </p:cNvPr>
+          <p:cNvSpPr txBox="1">
+            <a:spLocks/>
+          </p:cNvSpPr>
+          <p:nvPr/>
+        </p:nvSpPr>
+        <p:spPr>
+          <a:xfrm>
+            <a:off x="6762307" y="1871330"/>
+            <a:ext cx="4846222" cy="4403998"/>
+          </a:xfrm>
+          <a:prstGeom prst="rect">
+            <a:avLst/>
+          </a:prstGeom>
+          <a:solidFill>
+            <a:schemeClr val="bg1"/>
+          </a:solidFill>
+        </p:spPr>
+        <p:txBody>
+          <a:bodyPr vert="horz" lIns="91440" tIns="45720" rIns="91440" bIns="45720" rtlCol="0" anchor="ctr">
+            <a:noAutofit/>
+          </a:bodyPr>
+          <a:lstStyle>
+            <a:lvl1pPr marL="0" indent="0" algn="l" defTabSz="914400" rtl="0" eaLnBrk="1" latinLnBrk="0" hangingPunct="1">
+              <a:lnSpc>
+                <a:spcPct val="120000"/>
+              </a:lnSpc>
+              <a:spcBef>
+                <a:spcPts val="1000"/>
+              </a:spcBef>
+              <a:buSzPct val="80000"/>
+              <a:buFont typeface="Arial" panose="020B0604020202020204" pitchFamily="34" charset="0"/>
+              <a:buNone/>
+              <a:defRPr sz="1600" b="1" kern="1200" cap="all" spc="300" baseline="0">
+                <a:solidFill>
+                  <a:schemeClr val="tx1"/>
+                </a:solidFill>
+                <a:latin typeface="+mn-lt"/>
+                <a:ea typeface="+mn-ea"/>
+                <a:cs typeface="+mn-cs"/>
+              </a:defRPr>
+            </a:lvl1pPr>
+            <a:lvl2pPr marL="457200" indent="0" algn="l" defTabSz="914400" rtl="0" eaLnBrk="1" latinLnBrk="0" hangingPunct="1">
+              <a:lnSpc>
+                <a:spcPct val="120000"/>
+              </a:lnSpc>
+              <a:spcBef>
+                <a:spcPts val="500"/>
+              </a:spcBef>
+              <a:buSzPct val="80000"/>
+              <a:buFont typeface="Avenir Next LT Pro Light" panose="020B0304020202020204" pitchFamily="34" charset="0"/>
+              <a:buNone/>
+              <a:defRPr sz="2000" b="1" kern="1200">
+                <a:solidFill>
+                  <a:schemeClr val="tx1"/>
+                </a:solidFill>
+                <a:latin typeface="+mn-lt"/>
+                <a:ea typeface="+mn-ea"/>
+                <a:cs typeface="+mn-cs"/>
+              </a:defRPr>
+            </a:lvl2pPr>
+            <a:lvl3pPr marL="914400" indent="0" algn="l" defTabSz="914400" rtl="0" eaLnBrk="1" latinLnBrk="0" hangingPunct="1">
+              <a:lnSpc>
+                <a:spcPct val="120000"/>
+              </a:lnSpc>
+              <a:spcBef>
+                <a:spcPts val="500"/>
+              </a:spcBef>
+              <a:buSzPct val="80000"/>
+              <a:buFont typeface="Arial" panose="020B0604020202020204" pitchFamily="34" charset="0"/>
+              <a:buNone/>
+              <a:defRPr sz="1800" b="1" kern="1200">
+                <a:solidFill>
+                  <a:schemeClr val="tx1"/>
+                </a:solidFill>
+                <a:latin typeface="+mn-lt"/>
+                <a:ea typeface="+mn-ea"/>
+                <a:cs typeface="+mn-cs"/>
+              </a:defRPr>
+            </a:lvl3pPr>
+            <a:lvl4pPr marL="1371600" indent="0" algn="l" defTabSz="914400" rtl="0" eaLnBrk="1" latinLnBrk="0" hangingPunct="1">
+              <a:lnSpc>
+                <a:spcPct val="120000"/>
+              </a:lnSpc>
+              <a:spcBef>
+                <a:spcPts val="500"/>
+              </a:spcBef>
+              <a:buSzPct val="80000"/>
+              <a:buFont typeface="Avenir Next LT Pro Light" panose="020B0304020202020204" pitchFamily="34" charset="0"/>
+              <a:buNone/>
+              <a:defRPr sz="1600" b="1" kern="1200">
+                <a:solidFill>
+                  <a:schemeClr val="tx1"/>
+                </a:solidFill>
+                <a:latin typeface="+mn-lt"/>
+                <a:ea typeface="+mn-ea"/>
+                <a:cs typeface="+mn-cs"/>
+              </a:defRPr>
+            </a:lvl4pPr>
+            <a:lvl5pPr marL="1828800" indent="0" algn="l" defTabSz="914400" rtl="0" eaLnBrk="1" latinLnBrk="0" hangingPunct="1">
+              <a:lnSpc>
+                <a:spcPct val="120000"/>
+              </a:lnSpc>
+              <a:spcBef>
+                <a:spcPts val="500"/>
+              </a:spcBef>
+              <a:buSzPct val="80000"/>
+              <a:buFont typeface="Arial" panose="020B0604020202020204" pitchFamily="34" charset="0"/>
+              <a:buNone/>
+              <a:defRPr sz="1600" b="1" kern="1200">
+                <a:solidFill>
+                  <a:schemeClr val="tx1"/>
+                </a:solidFill>
+                <a:latin typeface="+mn-lt"/>
+                <a:ea typeface="+mn-ea"/>
+                <a:cs typeface="+mn-cs"/>
+              </a:defRPr>
+            </a:lvl5pPr>
+            <a:lvl6pPr marL="2286000" indent="0" algn="l" defTabSz="914400" rtl="0" eaLnBrk="1" latinLnBrk="0" hangingPunct="1">
+              <a:lnSpc>
+                <a:spcPct val="90000"/>
+              </a:lnSpc>
+              <a:spcBef>
+                <a:spcPts val="500"/>
+              </a:spcBef>
+              <a:buFont typeface="Arial" panose="020B0604020202020204" pitchFamily="34" charset="0"/>
+              <a:buNone/>
+              <a:defRPr sz="1600" b="1" kern="1200">
+                <a:solidFill>
+                  <a:schemeClr val="tx1"/>
+                </a:solidFill>
+                <a:latin typeface="+mn-lt"/>
+                <a:ea typeface="+mn-ea"/>
+                <a:cs typeface="+mn-cs"/>
+              </a:defRPr>
+            </a:lvl6pPr>
+            <a:lvl7pPr marL="2743200" indent="0" algn="l" defTabSz="914400" rtl="0" eaLnBrk="1" latinLnBrk="0" hangingPunct="1">
+              <a:lnSpc>
+                <a:spcPct val="90000"/>
+              </a:lnSpc>
+              <a:spcBef>
+                <a:spcPts val="500"/>
+              </a:spcBef>
+              <a:buFont typeface="Arial" panose="020B0604020202020204" pitchFamily="34" charset="0"/>
+              <a:buNone/>
+              <a:defRPr sz="1600" b="1" kern="1200">
+                <a:solidFill>
+                  <a:schemeClr val="tx1"/>
+                </a:solidFill>
+                <a:latin typeface="+mn-lt"/>
+                <a:ea typeface="+mn-ea"/>
+                <a:cs typeface="+mn-cs"/>
+              </a:defRPr>
+            </a:lvl7pPr>
+            <a:lvl8pPr marL="3200400" indent="0" algn="l" defTabSz="914400" rtl="0" eaLnBrk="1" latinLnBrk="0" hangingPunct="1">
+              <a:lnSpc>
+                <a:spcPct val="90000"/>
+              </a:lnSpc>
+              <a:spcBef>
+                <a:spcPts val="500"/>
+              </a:spcBef>
+              <a:buFont typeface="Arial" panose="020B0604020202020204" pitchFamily="34" charset="0"/>
+              <a:buNone/>
+              <a:defRPr sz="1600" b="1" kern="1200">
+                <a:solidFill>
+                  <a:schemeClr val="tx1"/>
+                </a:solidFill>
+                <a:latin typeface="+mn-lt"/>
+                <a:ea typeface="+mn-ea"/>
+                <a:cs typeface="+mn-cs"/>
+              </a:defRPr>
+            </a:lvl8pPr>
+            <a:lvl9pPr marL="3657600" indent="0" algn="l" defTabSz="914400" rtl="0" eaLnBrk="1" latinLnBrk="0" hangingPunct="1">
+              <a:lnSpc>
+                <a:spcPct val="90000"/>
+              </a:lnSpc>
+              <a:spcBef>
+                <a:spcPts val="500"/>
+              </a:spcBef>
+              <a:buFont typeface="Arial" panose="020B0604020202020204" pitchFamily="34" charset="0"/>
+              <a:buNone/>
+              <a:defRPr sz="1600" b="1" kern="1200">
+                <a:solidFill>
+                  <a:schemeClr val="tx1"/>
+                </a:solidFill>
+                <a:latin typeface="+mn-lt"/>
+                <a:ea typeface="+mn-ea"/>
+                <a:cs typeface="+mn-cs"/>
+              </a:defRPr>
+            </a:lvl9pPr>
+          </a:lstStyle>
+          <a:p>
+            <a:r>
+              <a:rPr lang="fr-FR" sz="2000" b="0" dirty="0"/>
+              <a:t>Les </a:t>
+            </a:r>
+            <a:r>
+              <a:rPr lang="fr-FR" sz="2000" dirty="0"/>
+              <a:t>coefficients entiers </a:t>
+            </a:r>
+            <a:r>
+              <a:rPr lang="fr-FR" sz="2000" b="0" dirty="0"/>
+              <a:t>offrent une </a:t>
+            </a:r>
+            <a:r>
+              <a:rPr lang="fr-FR" sz="2000" dirty="0"/>
+              <a:t>complexité minimale</a:t>
+            </a:r>
+            <a:r>
+              <a:rPr lang="fr-FR" sz="2000" b="0" dirty="0"/>
+              <a:t>.</a:t>
+            </a:r>
+          </a:p>
+          <a:p>
+            <a:r>
+              <a:rPr lang="fr-FR" sz="2000" b="0" dirty="0"/>
+              <a:t>Nous gardons donc les </a:t>
+            </a:r>
+            <a:r>
+              <a:rPr lang="fr-FR" sz="2000" dirty="0"/>
+              <a:t>coefficients entiers </a:t>
+            </a:r>
+            <a:r>
+              <a:rPr lang="fr-FR" sz="2000" b="0" dirty="0"/>
+              <a:t>dans nos calculs de complexité (sans chiffre après la virgule).</a:t>
+            </a:r>
+          </a:p>
+        </p:txBody>
+      </p:sp>
+      <p:sp>
+        <p:nvSpPr>
+          <p:cNvPr id="6" name="Rectangle 5">
+            <a:extLst>
+              <a:ext uri="{FF2B5EF4-FFF2-40B4-BE49-F238E27FC236}">
+                <a16:creationId xmlns:a16="http://schemas.microsoft.com/office/drawing/2014/main" id="{2B9EC1A3-33B0-6D2F-8736-86479223D98D}"/>
+              </a:ext>
+            </a:extLst>
+          </p:cNvPr>
+          <p:cNvSpPr/>
+          <p:nvPr/>
+        </p:nvSpPr>
+        <p:spPr>
+          <a:xfrm>
+            <a:off x="2679405" y="2008287"/>
+            <a:ext cx="2349795" cy="224550"/>
+          </a:xfrm>
+          <a:prstGeom prst="rect">
+            <a:avLst/>
+          </a:prstGeom>
+          <a:solidFill>
+            <a:schemeClr val="bg1"/>
+          </a:solidFill>
+          <a:ln>
+            <a:noFill/>
+          </a:ln>
+        </p:spPr>
+        <p:style>
+          <a:lnRef idx="2">
+            <a:schemeClr val="accent1">
+              <a:shade val="15000"/>
+            </a:schemeClr>
+          </a:lnRef>
+          <a:fillRef idx="1">
+            <a:schemeClr val="accent1"/>
+          </a:fillRef>
+          <a:effectRef idx="0">
+            <a:schemeClr val="accent1"/>
+          </a:effectRef>
+          <a:fontRef idx="minor">
+            <a:schemeClr val="lt1"/>
+          </a:fontRef>
+        </p:style>
+        <p:txBody>
+          <a:bodyPr rtlCol="0" anchor="ctr"/>
+          <a:lstStyle/>
+          <a:p>
+            <a:pPr algn="ctr"/>
+            <a:endParaRPr lang="fr-FR"/>
+          </a:p>
+        </p:txBody>
+      </p:sp>
+      <p:sp>
+        <p:nvSpPr>
+          <p:cNvPr id="7" name="Rectangle 6">
+            <a:extLst>
+              <a:ext uri="{FF2B5EF4-FFF2-40B4-BE49-F238E27FC236}">
+                <a16:creationId xmlns:a16="http://schemas.microsoft.com/office/drawing/2014/main" id="{0977143F-58F6-DFFE-9749-0085AED05AFF}"/>
+              </a:ext>
+            </a:extLst>
+          </p:cNvPr>
+          <p:cNvSpPr/>
+          <p:nvPr/>
+        </p:nvSpPr>
+        <p:spPr>
+          <a:xfrm>
+            <a:off x="2679405" y="5808811"/>
+            <a:ext cx="2349795" cy="224550"/>
+          </a:xfrm>
+          <a:prstGeom prst="rect">
+            <a:avLst/>
+          </a:prstGeom>
+          <a:solidFill>
+            <a:schemeClr val="bg1"/>
+          </a:solidFill>
+          <a:ln>
+            <a:noFill/>
+          </a:ln>
+        </p:spPr>
+        <p:style>
+          <a:lnRef idx="2">
+            <a:schemeClr val="accent1">
+              <a:shade val="15000"/>
+            </a:schemeClr>
+          </a:lnRef>
+          <a:fillRef idx="1">
+            <a:schemeClr val="accent1"/>
+          </a:fillRef>
+          <a:effectRef idx="0">
+            <a:schemeClr val="accent1"/>
+          </a:effectRef>
+          <a:fontRef idx="minor">
+            <a:schemeClr val="lt1"/>
+          </a:fontRef>
+        </p:style>
+        <p:txBody>
+          <a:bodyPr rtlCol="0" anchor="ctr"/>
+          <a:lstStyle/>
+          <a:p>
+            <a:pPr algn="ctr"/>
+            <a:r>
+              <a:rPr lang="fr-FR" sz="800" dirty="0">
+                <a:solidFill>
+                  <a:schemeClr val="tx1"/>
+                </a:solidFill>
+              </a:rPr>
+              <a:t>Nombre de décimales des paramètres</a:t>
+            </a:r>
+          </a:p>
+        </p:txBody>
+      </p:sp>
     </p:spTree>
     <p:extLst>
       <p:ext uri="{BB962C8B-B14F-4D97-AF65-F5344CB8AC3E}">

</xml_diff>

<commit_message>
[DEV_MODEL]: modeil_tuning.py adaptations to plots, Soutenance.pptx minor modifs, Scrreenshots added for report
</commit_message>
<xml_diff>
--- a/Soutenance.pptx
+++ b/Soutenance.pptx
@@ -204,7 +204,7 @@
           <a:p>
             <a:fld id="{87F6452A-2A59-B34F-A75F-9F5D561EF825}" type="datetimeFigureOut">
               <a:rPr lang="fr-FR" smtClean="0"/>
-              <a:t>17/12/2023</a:t>
+              <a:t>18/12/2023</a:t>
             </a:fld>
             <a:endParaRPr lang="fr-FR"/>
           </a:p>
@@ -627,7 +627,7 @@
           <a:p>
             <a:fld id="{1C8322F6-1C60-46CF-968C-BC20E470F443}" type="datetimeFigureOut">
               <a:rPr lang="en-US" smtClean="0"/>
-              <a:t>12/17/23</a:t>
+              <a:t>12/18/23</a:t>
             </a:fld>
             <a:endParaRPr lang="en-US"/>
           </a:p>
@@ -1048,7 +1048,7 @@
           <a:p>
             <a:fld id="{1C8322F6-1C60-46CF-968C-BC20E470F443}" type="datetimeFigureOut">
               <a:rPr lang="en-US" smtClean="0"/>
-              <a:t>12/17/23</a:t>
+              <a:t>12/18/23</a:t>
             </a:fld>
             <a:endParaRPr lang="en-US"/>
           </a:p>
@@ -1425,7 +1425,7 @@
           <a:p>
             <a:fld id="{1C8322F6-1C60-46CF-968C-BC20E470F443}" type="datetimeFigureOut">
               <a:rPr lang="en-US" smtClean="0"/>
-              <a:t>12/17/23</a:t>
+              <a:t>12/18/23</a:t>
             </a:fld>
             <a:endParaRPr lang="en-US"/>
           </a:p>
@@ -1678,7 +1678,7 @@
           <a:p>
             <a:fld id="{1C8322F6-1C60-46CF-968C-BC20E470F443}" type="datetimeFigureOut">
               <a:rPr lang="en-US" smtClean="0"/>
-              <a:t>12/17/23</a:t>
+              <a:t>12/18/23</a:t>
             </a:fld>
             <a:endParaRPr lang="en-US"/>
           </a:p>
@@ -2012,7 +2012,7 @@
           <a:p>
             <a:fld id="{1C8322F6-1C60-46CF-968C-BC20E470F443}" type="datetimeFigureOut">
               <a:rPr lang="en-US" smtClean="0"/>
-              <a:t>12/17/23</a:t>
+              <a:t>12/18/23</a:t>
             </a:fld>
             <a:endParaRPr lang="en-US"/>
           </a:p>
@@ -2293,7 +2293,7 @@
           <a:p>
             <a:fld id="{1C8322F6-1C60-46CF-968C-BC20E470F443}" type="datetimeFigureOut">
               <a:rPr lang="en-US" smtClean="0"/>
-              <a:t>12/17/23</a:t>
+              <a:t>12/18/23</a:t>
             </a:fld>
             <a:endParaRPr lang="en-US"/>
           </a:p>
@@ -2695,7 +2695,7 @@
           <a:p>
             <a:fld id="{1C8322F6-1C60-46CF-968C-BC20E470F443}" type="datetimeFigureOut">
               <a:rPr lang="en-US" smtClean="0"/>
-              <a:t>12/17/23</a:t>
+              <a:t>12/18/23</a:t>
             </a:fld>
             <a:endParaRPr lang="en-US"/>
           </a:p>
@@ -3156,7 +3156,7 @@
           <a:p>
             <a:fld id="{1C8322F6-1C60-46CF-968C-BC20E470F443}" type="datetimeFigureOut">
               <a:rPr lang="en-US" smtClean="0"/>
-              <a:t>12/17/23</a:t>
+              <a:t>12/18/23</a:t>
             </a:fld>
             <a:endParaRPr lang="en-US"/>
           </a:p>
@@ -3389,7 +3389,7 @@
           <a:p>
             <a:fld id="{1C8322F6-1C60-46CF-968C-BC20E470F443}" type="datetimeFigureOut">
               <a:rPr lang="en-US" smtClean="0"/>
-              <a:t>12/17/23</a:t>
+              <a:t>12/18/23</a:t>
             </a:fld>
             <a:endParaRPr lang="en-US"/>
           </a:p>
@@ -3811,7 +3811,7 @@
           <a:p>
             <a:fld id="{1C8322F6-1C60-46CF-968C-BC20E470F443}" type="datetimeFigureOut">
               <a:rPr lang="en-US" smtClean="0"/>
-              <a:t>12/17/23</a:t>
+              <a:t>12/18/23</a:t>
             </a:fld>
             <a:endParaRPr lang="en-US"/>
           </a:p>
@@ -4010,7 +4010,7 @@
           <a:p>
             <a:fld id="{1C8322F6-1C60-46CF-968C-BC20E470F443}" type="datetimeFigureOut">
               <a:rPr lang="en-US" smtClean="0"/>
-              <a:t>12/17/23</a:t>
+              <a:t>12/18/23</a:t>
             </a:fld>
             <a:endParaRPr lang="en-US"/>
           </a:p>
@@ -4323,7 +4323,7 @@
           <a:p>
             <a:fld id="{1C8322F6-1C60-46CF-968C-BC20E470F443}" type="datetimeFigureOut">
               <a:rPr lang="en-US" smtClean="0"/>
-              <a:t>12/17/23</a:t>
+              <a:t>12/18/23</a:t>
             </a:fld>
             <a:endParaRPr lang="en-US"/>
           </a:p>
@@ -4736,7 +4736,7 @@
           <a:p>
             <a:fld id="{1C8322F6-1C60-46CF-968C-BC20E470F443}" type="datetimeFigureOut">
               <a:rPr lang="en-US" smtClean="0"/>
-              <a:t>12/17/23</a:t>
+              <a:t>12/18/23</a:t>
             </a:fld>
             <a:endParaRPr lang="en-US"/>
           </a:p>
@@ -6159,11 +6159,6 @@
               <a:rPr lang="fr-FR" sz="1800" dirty="0"/>
               <a:t>a = 1 ; a = 1.2 ; a = 1.23 ; a=1.234 ; etc.</a:t>
             </a:r>
-          </a:p>
-          <a:p>
-            <a:pPr marL="0" indent="0" algn="ctr">
-              <a:buNone/>
-            </a:pPr>
             <a:endParaRPr lang="fr-FR" dirty="0"/>
           </a:p>
           <a:p>

</xml_diff>